<commit_message>
Added a link of the source code into Structure Examination.pptx.
</commit_message>
<xml_diff>
--- a/art/Structure Examination.pptx
+++ b/art/Structure Examination.pptx
@@ -296,7 +296,7 @@
           <a:p>
             <a:fld id="{E90ED720-0104-4369-84BC-D37694168613}" type="datetimeFigureOut">
               <a:rPr kumimoji="1" lang="ja-JP" altLang="en-US" smtClean="0"/>
-              <a:t>2019/6/20</a:t>
+              <a:t>2019/7/4</a:t>
             </a:fld>
             <a:endParaRPr kumimoji="1" lang="ja-JP" altLang="en-US"/>
           </a:p>
@@ -493,7 +493,7 @@
           <a:p>
             <a:fld id="{E90ED720-0104-4369-84BC-D37694168613}" type="datetimeFigureOut">
               <a:rPr kumimoji="1" lang="ja-JP" altLang="en-US" smtClean="0"/>
-              <a:t>2019/6/20</a:t>
+              <a:t>2019/7/4</a:t>
             </a:fld>
             <a:endParaRPr kumimoji="1" lang="ja-JP" altLang="en-US"/>
           </a:p>
@@ -700,7 +700,7 @@
           <a:p>
             <a:fld id="{E90ED720-0104-4369-84BC-D37694168613}" type="datetimeFigureOut">
               <a:rPr kumimoji="1" lang="ja-JP" altLang="en-US" smtClean="0"/>
-              <a:t>2019/6/20</a:t>
+              <a:t>2019/7/4</a:t>
             </a:fld>
             <a:endParaRPr kumimoji="1" lang="ja-JP" altLang="en-US"/>
           </a:p>
@@ -897,7 +897,7 @@
           <a:p>
             <a:fld id="{E90ED720-0104-4369-84BC-D37694168613}" type="datetimeFigureOut">
               <a:rPr kumimoji="1" lang="ja-JP" altLang="en-US" smtClean="0"/>
-              <a:t>2019/6/20</a:t>
+              <a:t>2019/7/4</a:t>
             </a:fld>
             <a:endParaRPr kumimoji="1" lang="ja-JP" altLang="en-US"/>
           </a:p>
@@ -1138,7 +1138,7 @@
           <a:p>
             <a:fld id="{E90ED720-0104-4369-84BC-D37694168613}" type="datetimeFigureOut">
               <a:rPr kumimoji="1" lang="ja-JP" altLang="en-US" smtClean="0"/>
-              <a:t>2019/6/20</a:t>
+              <a:t>2019/7/4</a:t>
             </a:fld>
             <a:endParaRPr kumimoji="1" lang="ja-JP" altLang="en-US"/>
           </a:p>
@@ -1485,7 +1485,7 @@
           <a:p>
             <a:fld id="{E90ED720-0104-4369-84BC-D37694168613}" type="datetimeFigureOut">
               <a:rPr kumimoji="1" lang="ja-JP" altLang="en-US" smtClean="0"/>
-              <a:t>2019/6/20</a:t>
+              <a:t>2019/7/4</a:t>
             </a:fld>
             <a:endParaRPr kumimoji="1" lang="ja-JP" altLang="en-US"/>
           </a:p>
@@ -1966,7 +1966,7 @@
           <a:p>
             <a:fld id="{E90ED720-0104-4369-84BC-D37694168613}" type="datetimeFigureOut">
               <a:rPr kumimoji="1" lang="ja-JP" altLang="en-US" smtClean="0"/>
-              <a:t>2019/6/20</a:t>
+              <a:t>2019/7/4</a:t>
             </a:fld>
             <a:endParaRPr kumimoji="1" lang="ja-JP" altLang="en-US"/>
           </a:p>
@@ -2079,7 +2079,7 @@
           <a:p>
             <a:fld id="{E90ED720-0104-4369-84BC-D37694168613}" type="datetimeFigureOut">
               <a:rPr kumimoji="1" lang="ja-JP" altLang="en-US" smtClean="0"/>
-              <a:t>2019/6/20</a:t>
+              <a:t>2019/7/4</a:t>
             </a:fld>
             <a:endParaRPr kumimoji="1" lang="ja-JP" altLang="en-US"/>
           </a:p>
@@ -2169,7 +2169,7 @@
           <a:p>
             <a:fld id="{E90ED720-0104-4369-84BC-D37694168613}" type="datetimeFigureOut">
               <a:rPr kumimoji="1" lang="ja-JP" altLang="en-US" smtClean="0"/>
-              <a:t>2019/6/20</a:t>
+              <a:t>2019/7/4</a:t>
             </a:fld>
             <a:endParaRPr kumimoji="1" lang="ja-JP" altLang="en-US"/>
           </a:p>
@@ -2473,7 +2473,7 @@
           <a:p>
             <a:fld id="{E90ED720-0104-4369-84BC-D37694168613}" type="datetimeFigureOut">
               <a:rPr kumimoji="1" lang="ja-JP" altLang="en-US" smtClean="0"/>
-              <a:t>2019/6/20</a:t>
+              <a:t>2019/7/4</a:t>
             </a:fld>
             <a:endParaRPr kumimoji="1" lang="ja-JP" altLang="en-US"/>
           </a:p>
@@ -2721,7 +2721,7 @@
           <a:p>
             <a:fld id="{E90ED720-0104-4369-84BC-D37694168613}" type="datetimeFigureOut">
               <a:rPr kumimoji="1" lang="ja-JP" altLang="en-US" smtClean="0"/>
-              <a:t>2019/6/20</a:t>
+              <a:t>2019/7/4</a:t>
             </a:fld>
             <a:endParaRPr kumimoji="1" lang="ja-JP" altLang="en-US"/>
           </a:p>
@@ -2961,7 +2961,7 @@
           <a:p>
             <a:fld id="{E90ED720-0104-4369-84BC-D37694168613}" type="datetimeFigureOut">
               <a:rPr kumimoji="1" lang="ja-JP" altLang="en-US" smtClean="0"/>
-              <a:t>2019/6/20</a:t>
+              <a:t>2019/7/4</a:t>
             </a:fld>
             <a:endParaRPr kumimoji="1" lang="ja-JP" altLang="en-US"/>
           </a:p>
@@ -3603,15 +3603,7 @@
             <a:pPr algn="ctr"/>
             <a:r>
               <a:rPr lang="en-US" altLang="ja-JP" sz="1100" b="1" dirty="0" smtClean="0"/>
-              <a:t>It’s almos</a:t>
-            </a:r>
-            <a:r>
-              <a:rPr lang="en-US" altLang="ja-JP" sz="1100" b="1" dirty="0" smtClean="0"/>
-              <a:t>t used by </a:t>
-            </a:r>
-            <a:r>
-              <a:rPr lang="en-US" altLang="ja-JP" sz="1100" b="1" dirty="0" smtClean="0"/>
-              <a:t>WiFiP2pManager’s methods.</a:t>
+              <a:t>It’s almost used by WiFiP2pManager’s methods.</a:t>
             </a:r>
             <a:r>
               <a:rPr lang="ja-JP" altLang="en-US" sz="1100" b="1" dirty="0" smtClean="0"/>
@@ -4079,11 +4071,7 @@
           <a:p>
             <a:r>
               <a:rPr lang="en-US" altLang="ja-JP" sz="1000" b="1" dirty="0" smtClean="0"/>
-              <a:t>Request to start </a:t>
-            </a:r>
-            <a:r>
-              <a:rPr lang="en-US" altLang="ja-JP" sz="1000" b="1" dirty="0" smtClean="0"/>
-              <a:t>discovering  of </a:t>
+              <a:t>Request to start discovering  of </a:t>
             </a:r>
             <a:r>
               <a:rPr lang="en-US" altLang="ja-JP" sz="1000" b="1" dirty="0"/>
@@ -4547,7 +4535,6 @@
               <a:rPr lang="en-US" altLang="ja-JP" sz="1000" dirty="0"/>
               <a:t>.</a:t>
             </a:r>
-            <a:endParaRPr lang="en-US" altLang="ja-JP" sz="1000" dirty="0"/>
           </a:p>
         </p:txBody>
       </p:sp>
@@ -4914,7 +4901,6 @@
               <a:rPr lang="en-US" altLang="ja-JP" sz="1100" b="1" dirty="0"/>
               <a:t>.</a:t>
             </a:r>
-            <a:endParaRPr lang="en-US" altLang="ja-JP" sz="1100" b="1" dirty="0"/>
           </a:p>
         </p:txBody>
       </p:sp>
@@ -4983,11 +4969,7 @@
             </a:r>
             <a:r>
               <a:rPr lang="en-US" altLang="ja-JP" sz="1100" b="1" dirty="0" smtClean="0"/>
-              <a:t> </a:t>
-            </a:r>
-            <a:r>
-              <a:rPr lang="en-US" altLang="ja-JP" sz="1100" b="1" dirty="0" smtClean="0"/>
-              <a:t>Direct feasibility </a:t>
+              <a:t> Direct feasibility </a:t>
             </a:r>
             <a:r>
               <a:rPr lang="en-US" altLang="ja-JP" sz="1100" b="1" dirty="0" err="1" smtClean="0"/>
@@ -4995,11 +4977,7 @@
             </a:r>
             <a:r>
               <a:rPr lang="en-US" altLang="ja-JP" sz="1100" b="1" dirty="0" smtClean="0"/>
-              <a:t> </a:t>
-            </a:r>
-            <a:r>
-              <a:rPr lang="en-US" altLang="ja-JP" sz="1100" b="1" dirty="0" smtClean="0"/>
-              <a:t>EXTRA_WIFI_STATE)</a:t>
+              <a:t> EXTRA_WIFI_STATE)</a:t>
             </a:r>
             <a:endParaRPr lang="en-US" altLang="ja-JP" sz="1100" b="1" dirty="0"/>
           </a:p>
@@ -5250,7 +5228,13 @@
           <a:bodyPr/>
           <a:lstStyle/>
           <a:p>
-            <a:endParaRPr kumimoji="1" lang="ja-JP" altLang="en-US"/>
+            <a:r>
+              <a:rPr lang="en-US" altLang="ja-JP" dirty="0">
+                <a:hlinkClick r:id="rId2"/>
+              </a:rPr>
+              <a:t>https://android.googlesource.com/platform/development/+/master/samples/WiFiDirectDemo/</a:t>
+            </a:r>
+            <a:endParaRPr kumimoji="1" lang="ja-JP" altLang="en-US" dirty="0"/>
           </a:p>
         </p:txBody>
       </p:sp>
@@ -6236,11 +6220,7 @@
             </a:r>
             <a:r>
               <a:rPr lang="ja-JP" altLang="en-US" dirty="0" smtClean="0"/>
-              <a:t> </a:t>
-            </a:r>
-            <a:r>
-              <a:rPr lang="ja-JP" altLang="en-US" dirty="0" smtClean="0"/>
-              <a:t>→ </a:t>
+              <a:t> → </a:t>
             </a:r>
             <a:r>
               <a:rPr lang="en-US" altLang="ja-JP" dirty="0" smtClean="0"/>
@@ -7725,8 +7705,21 @@
           <a:p>
             <a:r>
               <a:rPr lang="en-US" altLang="ja-JP" b="1" dirty="0"/>
-              <a:t>MVVM +  Android Architecture Components</a:t>
-            </a:r>
+              <a:t>MVVM +  Android Architecture </a:t>
+            </a:r>
+            <a:r>
+              <a:rPr lang="en-US" altLang="ja-JP" b="1" dirty="0" smtClean="0"/>
+              <a:t>Components</a:t>
+            </a:r>
+          </a:p>
+          <a:p>
+            <a:r>
+              <a:rPr lang="en-US" altLang="ja-JP" dirty="0">
+                <a:hlinkClick r:id="rId2"/>
+              </a:rPr>
+              <a:t>https://github.com/baobab2013/makesmileshutter</a:t>
+            </a:r>
+            <a:endParaRPr lang="en-US" altLang="ja-JP" b="1" dirty="0"/>
           </a:p>
         </p:txBody>
       </p:sp>

</xml_diff>